<commit_message>
Added slides showing why "r_TE/TM" can be negative
</commit_message>
<xml_diff>
--- a/Presentations/Fresnel Equations Derivation.pptx
+++ b/Presentations/Fresnel Equations Derivation.pptx
@@ -5,7 +5,7 @@
     <p:sldMasterId id="2147483659" r:id="rId1"/>
   </p:sldMasterIdLst>
   <p:notesMasterIdLst>
-    <p:notesMasterId r:id="rId19"/>
+    <p:notesMasterId r:id="rId22"/>
   </p:notesMasterIdLst>
   <p:sldIdLst>
     <p:sldId id="256" r:id="rId2"/>
@@ -24,29 +24,32 @@
     <p:sldId id="268" r:id="rId15"/>
     <p:sldId id="269" r:id="rId16"/>
     <p:sldId id="270" r:id="rId17"/>
-    <p:sldId id="271" r:id="rId18"/>
+    <p:sldId id="275" r:id="rId18"/>
+    <p:sldId id="276" r:id="rId19"/>
+    <p:sldId id="277" r:id="rId20"/>
+    <p:sldId id="271" r:id="rId21"/>
   </p:sldIdLst>
   <p:sldSz cx="9144000" cy="5143500" type="screen16x9"/>
   <p:notesSz cx="6858000" cy="9144000"/>
   <p:embeddedFontLst>
     <p:embeddedFont>
       <p:font typeface="Amatic SC" pitchFamily="2" charset="-79"/>
-      <p:regular r:id="rId20"/>
-      <p:bold r:id="rId21"/>
+      <p:regular r:id="rId23"/>
+      <p:bold r:id="rId24"/>
     </p:embeddedFont>
     <p:embeddedFont>
       <p:font typeface="Roboto" panose="02000000000000000000" pitchFamily="2" charset="0"/>
-      <p:regular r:id="rId22"/>
-      <p:bold r:id="rId23"/>
-      <p:italic r:id="rId24"/>
-      <p:boldItalic r:id="rId25"/>
+      <p:regular r:id="rId25"/>
+      <p:bold r:id="rId26"/>
+      <p:italic r:id="rId27"/>
+      <p:boldItalic r:id="rId28"/>
     </p:embeddedFont>
     <p:embeddedFont>
       <p:font typeface="Source Code Pro" panose="020B0509030403020204" pitchFamily="49" charset="0"/>
-      <p:regular r:id="rId26"/>
-      <p:bold r:id="rId27"/>
-      <p:italic r:id="rId28"/>
-      <p:boldItalic r:id="rId29"/>
+      <p:regular r:id="rId29"/>
+      <p:bold r:id="rId30"/>
+      <p:italic r:id="rId31"/>
+      <p:boldItalic r:id="rId32"/>
     </p:embeddedFont>
   </p:embeddedFontLst>
   <p:defaultTextStyle>
@@ -1472,6 +1475,115 @@
 </file>
 
 <file path=ppt/notesSlides/notesSlide16.xml><?xml version="1.0" encoding="utf-8"?>
+<p:notes xmlns:a="http://schemas.openxmlformats.org/drawingml/2006/main" xmlns:r="http://schemas.openxmlformats.org/officeDocument/2006/relationships" xmlns:p="http://schemas.openxmlformats.org/presentationml/2006/main" showMasterSp="0" showMasterPhAnim="0">
+  <p:cSld>
+    <p:spTree>
+      <p:nvGrpSpPr>
+        <p:cNvPr id="1" name="Shape 177"/>
+        <p:cNvGrpSpPr/>
+        <p:nvPr/>
+      </p:nvGrpSpPr>
+      <p:grpSpPr>
+        <a:xfrm>
+          <a:off x="0" y="0"/>
+          <a:ext cx="0" cy="0"/>
+          <a:chOff x="0" y="0"/>
+          <a:chExt cx="0" cy="0"/>
+        </a:xfrm>
+      </p:grpSpPr>
+      <p:sp>
+        <p:nvSpPr>
+          <p:cNvPr id="178" name="Google Shape;178;g24c7489e19d_0_1:notes"/>
+          <p:cNvSpPr>
+            <a:spLocks noGrp="1" noRot="1" noChangeAspect="1"/>
+          </p:cNvSpPr>
+          <p:nvPr>
+            <p:ph type="sldImg" idx="2"/>
+          </p:nvPr>
+        </p:nvSpPr>
+        <p:spPr>
+          <a:xfrm>
+            <a:off x="381000" y="685800"/>
+            <a:ext cx="6096000" cy="3429000"/>
+          </a:xfrm>
+          <a:custGeom>
+            <a:avLst/>
+            <a:gdLst/>
+            <a:ahLst/>
+            <a:cxnLst/>
+            <a:rect l="l" t="t" r="r" b="b"/>
+            <a:pathLst>
+              <a:path w="120000" h="120000" extrusionOk="0">
+                <a:moveTo>
+                  <a:pt x="0" y="0"/>
+                </a:moveTo>
+                <a:lnTo>
+                  <a:pt x="120000" y="0"/>
+                </a:lnTo>
+                <a:lnTo>
+                  <a:pt x="120000" y="120000"/>
+                </a:lnTo>
+                <a:lnTo>
+                  <a:pt x="0" y="120000"/>
+                </a:lnTo>
+                <a:close/>
+              </a:path>
+            </a:pathLst>
+          </a:custGeom>
+        </p:spPr>
+      </p:sp>
+      <p:sp>
+        <p:nvSpPr>
+          <p:cNvPr id="179" name="Google Shape;179;g24c7489e19d_0_1:notes"/>
+          <p:cNvSpPr txBox="1">
+            <a:spLocks noGrp="1"/>
+          </p:cNvSpPr>
+          <p:nvPr>
+            <p:ph type="body" idx="1"/>
+          </p:nvPr>
+        </p:nvSpPr>
+        <p:spPr>
+          <a:xfrm>
+            <a:off x="685800" y="4343400"/>
+            <a:ext cx="5486400" cy="4114800"/>
+          </a:xfrm>
+          <a:prstGeom prst="rect">
+            <a:avLst/>
+          </a:prstGeom>
+        </p:spPr>
+        <p:txBody>
+          <a:bodyPr spcFirstLastPara="1" wrap="square" lIns="91425" tIns="91425" rIns="91425" bIns="91425" anchor="t" anchorCtr="0">
+            <a:noAutofit/>
+          </a:bodyPr>
+          <a:lstStyle/>
+          <a:p>
+            <a:pPr marL="0" lvl="0" indent="0" algn="l" rtl="0">
+              <a:spcBef>
+                <a:spcPts val="0"/>
+              </a:spcBef>
+              <a:spcAft>
+                <a:spcPts val="0"/>
+              </a:spcAft>
+              <a:buNone/>
+            </a:pPr>
+            <a:endParaRPr/>
+          </a:p>
+        </p:txBody>
+      </p:sp>
+    </p:spTree>
+    <p:extLst>
+      <p:ext uri="{BB962C8B-B14F-4D97-AF65-F5344CB8AC3E}">
+        <p14:creationId xmlns:p14="http://schemas.microsoft.com/office/powerpoint/2010/main" val="3986638668"/>
+      </p:ext>
+    </p:extLst>
+  </p:cSld>
+  <p:clrMapOvr>
+    <a:masterClrMapping/>
+  </p:clrMapOvr>
+</p:notes>
+</file>
+
+<file path=ppt/notesSlides/notesSlide17.xml><?xml version="1.0" encoding="utf-8"?>
 <p:notes xmlns:a="http://schemas.openxmlformats.org/drawingml/2006/main" xmlns:r="http://schemas.openxmlformats.org/officeDocument/2006/relationships" xmlns:p="http://schemas.openxmlformats.org/presentationml/2006/main" showMasterSp="0" showMasterPhAnim="0">
   <p:cSld>
     <p:spTree>
@@ -10201,6 +10313,54 @@
               </a:spcAft>
               <a:buNone/>
             </a:pPr>
+            <a:endParaRPr lang="en-GB" dirty="0"/>
+          </a:p>
+          <a:p>
+            <a:pPr marL="0" lvl="0" indent="0" algn="l" rtl="0">
+              <a:spcBef>
+                <a:spcPts val="1200"/>
+              </a:spcBef>
+              <a:spcAft>
+                <a:spcPts val="0"/>
+              </a:spcAft>
+              <a:buNone/>
+            </a:pPr>
+            <a:endParaRPr lang="en-GB" dirty="0"/>
+          </a:p>
+          <a:p>
+            <a:pPr marL="0" lvl="0" indent="0" algn="l" rtl="0">
+              <a:spcBef>
+                <a:spcPts val="1200"/>
+              </a:spcBef>
+              <a:spcAft>
+                <a:spcPts val="0"/>
+              </a:spcAft>
+              <a:buNone/>
+            </a:pPr>
+            <a:endParaRPr lang="en-GB" dirty="0"/>
+          </a:p>
+          <a:p>
+            <a:pPr marL="0" lvl="0" indent="0" algn="l" rtl="0">
+              <a:spcBef>
+                <a:spcPts val="1200"/>
+              </a:spcBef>
+              <a:spcAft>
+                <a:spcPts val="0"/>
+              </a:spcAft>
+              <a:buNone/>
+            </a:pPr>
+            <a:endParaRPr lang="en-GB" dirty="0"/>
+          </a:p>
+          <a:p>
+            <a:pPr marL="0" lvl="0" indent="0" algn="l" rtl="0">
+              <a:spcBef>
+                <a:spcPts val="1200"/>
+              </a:spcBef>
+              <a:spcAft>
+                <a:spcPts val="0"/>
+              </a:spcAft>
+              <a:buNone/>
+            </a:pPr>
             <a:r>
               <a:rPr lang="en-GB" dirty="0"/>
               <a:t>Internal reflection (think glass-to-air) occurs when 		</a:t>
@@ -10432,7 +10592,7 @@
             </a:pPr>
             <a:r>
               <a:rPr lang="en-GB" dirty="0"/>
-              <a:t>Blue = </a:t>
+              <a:t>Green = </a:t>
             </a:r>
             <a:r>
               <a:rPr lang="en-GB" dirty="0" err="1"/>
@@ -10555,7 +10715,7 @@
   <p:cSld>
     <p:spTree>
       <p:nvGrpSpPr>
-        <p:cNvPr id="1" name="Shape 189"/>
+        <p:cNvPr id="1" name="Shape 180"/>
         <p:cNvGrpSpPr/>
         <p:nvPr/>
       </p:nvGrpSpPr>
@@ -10569,7 +10729,7 @@
       </p:grpSpPr>
       <p:sp>
         <p:nvSpPr>
-          <p:cNvPr id="190" name="Google Shape;190;p28"/>
+          <p:cNvPr id="181" name="Google Shape;181;p27"/>
           <p:cNvSpPr txBox="1">
             <a:spLocks noGrp="1"/>
           </p:cNvSpPr>
@@ -10579,8 +10739,8 @@
         </p:nvSpPr>
         <p:spPr>
           <a:xfrm>
-            <a:off x="166325" y="78250"/>
-            <a:ext cx="8520600" cy="801000"/>
+            <a:off x="145550" y="70800"/>
+            <a:ext cx="7614600" cy="531600"/>
           </a:xfrm>
           <a:prstGeom prst="rect">
             <a:avLst/>
@@ -10588,7 +10748,7 @@
         </p:spPr>
         <p:txBody>
           <a:bodyPr spcFirstLastPara="1" wrap="square" lIns="91425" tIns="91425" rIns="91425" bIns="91425" anchor="t" anchorCtr="0">
-            <a:normAutofit fontScale="90000"/>
+            <a:noAutofit/>
           </a:bodyPr>
           <a:lstStyle/>
           <a:p>
@@ -10602,10 +10762,10 @@
               <a:buNone/>
             </a:pPr>
             <a:r>
-              <a:rPr lang="en-GB"/>
-              <a:t>VISUALIZations</a:t>
+              <a:rPr lang="en-US" sz="3200" dirty="0"/>
+              <a:t>How do we make sense of the negative reflection coefficient?</a:t>
             </a:r>
-            <a:endParaRPr/>
+            <a:endParaRPr sz="3200" dirty="0"/>
           </a:p>
           <a:p>
             <a:pPr marL="0" lvl="0" indent="0" algn="l" rtl="0">
@@ -10617,25 +10777,107 @@
               </a:spcAft>
               <a:buNone/>
             </a:pPr>
-            <a:endParaRPr/>
+            <a:endParaRPr sz="3200" dirty="0"/>
+          </a:p>
+        </p:txBody>
+      </p:sp>
+      <p:sp>
+        <p:nvSpPr>
+          <p:cNvPr id="182" name="Google Shape;182;p27"/>
+          <p:cNvSpPr txBox="1">
+            <a:spLocks noGrp="1"/>
+          </p:cNvSpPr>
+          <p:nvPr>
+            <p:ph type="body" idx="1"/>
+          </p:nvPr>
+        </p:nvSpPr>
+        <p:spPr>
+          <a:xfrm>
+            <a:off x="145550" y="685350"/>
+            <a:ext cx="3329700" cy="1737600"/>
+          </a:xfrm>
+          <a:prstGeom prst="rect">
+            <a:avLst/>
+          </a:prstGeom>
+        </p:spPr>
+        <p:txBody>
+          <a:bodyPr spcFirstLastPara="1" wrap="square" lIns="91425" tIns="91425" rIns="91425" bIns="91425" anchor="t" anchorCtr="0">
+            <a:normAutofit fontScale="85000" lnSpcReduction="20000"/>
+          </a:bodyPr>
+          <a:lstStyle/>
+          <a:p>
+            <a:pPr marL="0" lvl="0" indent="0" algn="l" rtl="0">
+              <a:spcBef>
+                <a:spcPts val="0"/>
+              </a:spcBef>
+              <a:spcAft>
+                <a:spcPts val="0"/>
+              </a:spcAft>
+              <a:buNone/>
+            </a:pPr>
+            <a:r>
+              <a:rPr lang="en-GB" dirty="0"/>
+              <a:t>Red = </a:t>
+            </a:r>
+            <a:r>
+              <a:rPr lang="en-GB" dirty="0" err="1"/>
+              <a:t>t_TE</a:t>
+            </a:r>
+            <a:r>
+              <a:rPr lang="en-GB" dirty="0"/>
+              <a:t> </a:t>
+            </a:r>
+            <a:endParaRPr dirty="0"/>
           </a:p>
           <a:p>
             <a:pPr marL="0" lvl="0" indent="0" algn="l" rtl="0">
               <a:spcBef>
-                <a:spcPts val="0"/>
+                <a:spcPts val="1200"/>
               </a:spcBef>
               <a:spcAft>
                 <a:spcPts val="0"/>
               </a:spcAft>
               <a:buNone/>
             </a:pPr>
-            <a:endParaRPr/>
+            <a:r>
+              <a:rPr lang="en-GB" dirty="0"/>
+              <a:t>Blue = </a:t>
+            </a:r>
+            <a:r>
+              <a:rPr lang="en-GB" dirty="0" err="1"/>
+              <a:t>r_TE</a:t>
+            </a:r>
+            <a:endParaRPr dirty="0"/>
+          </a:p>
+          <a:p>
+            <a:pPr marL="0" lvl="0" indent="0" algn="l" rtl="0">
+              <a:spcBef>
+                <a:spcPts val="1200"/>
+              </a:spcBef>
+              <a:spcAft>
+                <a:spcPts val="1200"/>
+              </a:spcAft>
+              <a:buNone/>
+            </a:pPr>
+            <a:r>
+              <a:rPr lang="en-GB" dirty="0"/>
+              <a:t>For normal incidence (when the angle of incidence is zero) {</a:t>
+            </a:r>
+            <a:r>
+              <a:rPr lang="en-GB" i="1" dirty="0"/>
+              <a:t>external reflection</a:t>
+            </a:r>
+            <a:r>
+              <a:rPr lang="en-GB" dirty="0"/>
+              <a:t>}</a:t>
+            </a:r>
+            <a:endParaRPr dirty="0"/>
           </a:p>
         </p:txBody>
       </p:sp>
       <p:pic>
         <p:nvPicPr>
-          <p:cNvPr id="191" name="Google Shape;191;p28"/>
+          <p:cNvPr id="183" name="Google Shape;183;p27"/>
           <p:cNvPicPr preferRelativeResize="0"/>
           <p:nvPr/>
         </p:nvPicPr>
@@ -10649,8 +10891,8 @@
         </p:blipFill>
         <p:spPr>
           <a:xfrm>
-            <a:off x="4983325" y="659313"/>
-            <a:ext cx="3911276" cy="3911276"/>
+            <a:off x="4199467" y="753084"/>
+            <a:ext cx="4656666" cy="3505650"/>
           </a:xfrm>
           <a:prstGeom prst="rect">
             <a:avLst/>
@@ -10661,16 +10903,24 @@
           </a:ln>
         </p:spPr>
       </p:pic>
-      <p:sp>
-        <p:nvSpPr>
-          <p:cNvPr id="192" name="Google Shape;192;p28"/>
-          <p:cNvSpPr txBox="1"/>
+      <p:pic>
+        <p:nvPicPr>
+          <p:cNvPr id="185" name="Google Shape;185;p27" title="[102,102,102,&quot;https://www.codecogs.com/eqnedit.php?latex=r_%7BTE%7D%3D%5Cfrac%7Bcos(%5Ctheta)-%5Csqrt%7Bn%5E2-sin%5E%7B2%7D(%5Ctheta)%7D%7D%7Bcos(%5Ctheta)%2B%5Csqrt%7Bn%5E2-sin%5E%7B2%7D(%5Ctheta)%7D%7D#0&quot;]"/>
+          <p:cNvPicPr preferRelativeResize="0"/>
           <p:nvPr/>
-        </p:nvSpPr>
+        </p:nvPicPr>
+        <p:blipFill>
+          <a:blip r:embed="rId4">
+            <a:alphaModFix/>
+          </a:blip>
+          <a:stretch>
+            <a:fillRect/>
+          </a:stretch>
+        </p:blipFill>
         <p:spPr>
           <a:xfrm>
-            <a:off x="186900" y="996850"/>
-            <a:ext cx="3800400" cy="1453800"/>
+            <a:off x="125565" y="2422950"/>
+            <a:ext cx="3827285" cy="801000"/>
           </a:xfrm>
           <a:prstGeom prst="rect">
             <a:avLst/>
@@ -10680,76 +10930,66 @@
             <a:noFill/>
           </a:ln>
         </p:spPr>
-        <p:txBody>
-          <a:bodyPr spcFirstLastPara="1" wrap="square" lIns="91425" tIns="91425" rIns="91425" bIns="91425" anchor="t" anchorCtr="0">
-            <a:noAutofit/>
-          </a:bodyPr>
-          <a:lstStyle/>
-          <a:p>
-            <a:pPr marL="0" lvl="0" indent="0" algn="l" rtl="0">
-              <a:spcBef>
-                <a:spcPts val="0"/>
-              </a:spcBef>
-              <a:spcAft>
-                <a:spcPts val="0"/>
-              </a:spcAft>
-              <a:buNone/>
-            </a:pPr>
-            <a:r>
-              <a:rPr lang="en-GB" b="1">
-                <a:latin typeface="Source Code Pro"/>
-                <a:ea typeface="Source Code Pro"/>
-                <a:cs typeface="Source Code Pro"/>
-                <a:sym typeface="Source Code Pro"/>
-              </a:rPr>
-              <a:t>Internal reflection</a:t>
-            </a:r>
-            <a:r>
-              <a:rPr lang="en-GB">
-                <a:latin typeface="Source Code Pro"/>
-                <a:ea typeface="Source Code Pro"/>
-                <a:cs typeface="Source Code Pro"/>
-                <a:sym typeface="Source Code Pro"/>
-              </a:rPr>
-              <a:t> (glass-to-air). Note that r_TE reaches a maximum at 0.73 radians which is the critical angle at which </a:t>
-            </a:r>
-            <a:r>
-              <a:rPr lang="en-GB" i="1">
-                <a:latin typeface="Source Code Pro"/>
-                <a:ea typeface="Source Code Pro"/>
-                <a:cs typeface="Source Code Pro"/>
-                <a:sym typeface="Source Code Pro"/>
-              </a:rPr>
-              <a:t>total internal reflection occurs</a:t>
-            </a:r>
-            <a:r>
-              <a:rPr lang="en-GB">
-                <a:latin typeface="Source Code Pro"/>
-                <a:ea typeface="Source Code Pro"/>
-                <a:cs typeface="Source Code Pro"/>
-                <a:sym typeface="Source Code Pro"/>
-              </a:rPr>
-              <a:t>.</a:t>
-            </a:r>
-            <a:endParaRPr>
-              <a:latin typeface="Source Code Pro"/>
-              <a:ea typeface="Source Code Pro"/>
-              <a:cs typeface="Source Code Pro"/>
-              <a:sym typeface="Source Code Pro"/>
-            </a:endParaRPr>
-          </a:p>
-        </p:txBody>
-      </p:sp>
+      </p:pic>
       <p:sp>
         <p:nvSpPr>
-          <p:cNvPr id="193" name="Google Shape;193;p28"/>
+          <p:cNvPr id="2" name="TextBox 1">
+            <a:extLst>
+              <a:ext uri="{FF2B5EF4-FFF2-40B4-BE49-F238E27FC236}">
+                <a16:creationId xmlns:a16="http://schemas.microsoft.com/office/drawing/2014/main" id="{213B48A7-2869-CA50-49E7-9C9304277494}"/>
+              </a:ext>
+            </a:extLst>
+          </p:cNvPr>
           <p:cNvSpPr txBox="1"/>
           <p:nvPr/>
         </p:nvSpPr>
         <p:spPr>
           <a:xfrm>
-            <a:off x="214600" y="2450650"/>
-            <a:ext cx="3946076" cy="1696000"/>
+            <a:off x="145550" y="3530600"/>
+            <a:ext cx="1886450" cy="307777"/>
+          </a:xfrm>
+          <a:prstGeom prst="rect">
+            <a:avLst/>
+          </a:prstGeom>
+          <a:noFill/>
+        </p:spPr>
+        <p:txBody>
+          <a:bodyPr wrap="square" rtlCol="0">
+            <a:spAutoFit/>
+          </a:bodyPr>
+          <a:lstStyle/>
+          <a:p>
+            <a:r>
+              <a:rPr lang="en-US" dirty="0"/>
+              <a:t>Recall also that: </a:t>
+            </a:r>
+          </a:p>
+        </p:txBody>
+      </p:sp>
+      <p:pic>
+        <p:nvPicPr>
+          <p:cNvPr id="3" name="Google Shape;124;p20" title="[102,102,102,&quot;https://www.codecogs.com/eqnedit.php?latex=r_%7BTE%7D%3D%5Cfrac%7BE_r%7D%7BE%7D#0&quot;]">
+            <a:extLst>
+              <a:ext uri="{FF2B5EF4-FFF2-40B4-BE49-F238E27FC236}">
+                <a16:creationId xmlns:a16="http://schemas.microsoft.com/office/drawing/2014/main" id="{E80F9313-41AC-C936-A09C-E825F99074EE}"/>
+              </a:ext>
+            </a:extLst>
+          </p:cNvPr>
+          <p:cNvPicPr preferRelativeResize="0"/>
+          <p:nvPr/>
+        </p:nvPicPr>
+        <p:blipFill>
+          <a:blip r:embed="rId5">
+            <a:alphaModFix/>
+          </a:blip>
+          <a:stretch>
+            <a:fillRect/>
+          </a:stretch>
+        </p:blipFill>
+        <p:spPr>
+          <a:xfrm>
+            <a:off x="1678559" y="3531834"/>
+            <a:ext cx="1437174" cy="726900"/>
           </a:xfrm>
           <a:prstGeom prst="rect">
             <a:avLst/>
@@ -10759,208 +10999,894 @@
             <a:noFill/>
           </a:ln>
         </p:spPr>
+      </p:pic>
+    </p:spTree>
+    <p:extLst>
+      <p:ext uri="{BB962C8B-B14F-4D97-AF65-F5344CB8AC3E}">
+        <p14:creationId xmlns:p14="http://schemas.microsoft.com/office/powerpoint/2010/main" val="1212990556"/>
+      </p:ext>
+    </p:extLst>
+  </p:cSld>
+  <p:clrMapOvr>
+    <a:masterClrMapping/>
+  </p:clrMapOvr>
+</p:sld>
+</file>
+
+<file path=ppt/slides/slide18.xml><?xml version="1.0" encoding="utf-8"?>
+<p:sld xmlns:a="http://schemas.openxmlformats.org/drawingml/2006/main" xmlns:r="http://schemas.openxmlformats.org/officeDocument/2006/relationships" xmlns:p="http://schemas.openxmlformats.org/presentationml/2006/main">
+  <p:cSld>
+    <p:spTree>
+      <p:nvGrpSpPr>
+        <p:cNvPr id="1" name=""/>
+        <p:cNvGrpSpPr/>
+        <p:nvPr/>
+      </p:nvGrpSpPr>
+      <p:grpSpPr>
+        <a:xfrm>
+          <a:off x="0" y="0"/>
+          <a:ext cx="0" cy="0"/>
+          <a:chOff x="0" y="0"/>
+          <a:chExt cx="0" cy="0"/>
+        </a:xfrm>
+      </p:grpSpPr>
+      <p:pic>
+        <p:nvPicPr>
+          <p:cNvPr id="5" name="Picture 4">
+            <a:extLst>
+              <a:ext uri="{FF2B5EF4-FFF2-40B4-BE49-F238E27FC236}">
+                <a16:creationId xmlns:a16="http://schemas.microsoft.com/office/drawing/2014/main" id="{0E985DFA-B06F-E95B-EFF7-B9B00CF666AA}"/>
+              </a:ext>
+            </a:extLst>
+          </p:cNvPr>
+          <p:cNvPicPr>
+            <a:picLocks noChangeAspect="1"/>
+          </p:cNvPicPr>
+          <p:nvPr/>
+        </p:nvPicPr>
+        <p:blipFill>
+          <a:blip r:embed="rId2"/>
+          <a:stretch>
+            <a:fillRect/>
+          </a:stretch>
+        </p:blipFill>
+        <p:spPr>
+          <a:xfrm>
+            <a:off x="452486" y="0"/>
+            <a:ext cx="7586133" cy="5143500"/>
+          </a:xfrm>
+          <a:prstGeom prst="rect">
+            <a:avLst/>
+          </a:prstGeom>
+        </p:spPr>
+      </p:pic>
+    </p:spTree>
+    <p:extLst>
+      <p:ext uri="{BB962C8B-B14F-4D97-AF65-F5344CB8AC3E}">
+        <p14:creationId xmlns:p14="http://schemas.microsoft.com/office/powerpoint/2010/main" val="3015147152"/>
+      </p:ext>
+    </p:extLst>
+  </p:cSld>
+  <p:clrMapOvr>
+    <a:masterClrMapping/>
+  </p:clrMapOvr>
+</p:sld>
+</file>
+
+<file path=ppt/slides/slide19.xml><?xml version="1.0" encoding="utf-8"?>
+<p:sld xmlns:a="http://schemas.openxmlformats.org/drawingml/2006/main" xmlns:r="http://schemas.openxmlformats.org/officeDocument/2006/relationships" xmlns:p="http://schemas.openxmlformats.org/presentationml/2006/main">
+  <p:cSld>
+    <p:spTree>
+      <p:nvGrpSpPr>
+        <p:cNvPr id="1" name=""/>
+        <p:cNvGrpSpPr/>
+        <p:nvPr/>
+      </p:nvGrpSpPr>
+      <p:grpSpPr>
+        <a:xfrm>
+          <a:off x="0" y="0"/>
+          <a:ext cx="0" cy="0"/>
+          <a:chOff x="0" y="0"/>
+          <a:chExt cx="0" cy="0"/>
+        </a:xfrm>
+      </p:grpSpPr>
+      <p:sp>
+        <p:nvSpPr>
+          <p:cNvPr id="2" name="Title 1">
+            <a:extLst>
+              <a:ext uri="{FF2B5EF4-FFF2-40B4-BE49-F238E27FC236}">
+                <a16:creationId xmlns:a16="http://schemas.microsoft.com/office/drawing/2014/main" id="{846F3AA7-4544-C9F1-ECA3-08C72AF82C86}"/>
+              </a:ext>
+            </a:extLst>
+          </p:cNvPr>
+          <p:cNvSpPr>
+            <a:spLocks noGrp="1"/>
+          </p:cNvSpPr>
+          <p:nvPr>
+            <p:ph type="title"/>
+          </p:nvPr>
+        </p:nvSpPr>
+        <p:spPr>
+          <a:xfrm>
+            <a:off x="151444" y="82550"/>
+            <a:ext cx="8520600" cy="801000"/>
+          </a:xfrm>
+        </p:spPr>
         <p:txBody>
-          <a:bodyPr spcFirstLastPara="1" wrap="square" lIns="91425" tIns="91425" rIns="91425" bIns="91425" anchor="t" anchorCtr="0">
-            <a:noAutofit/>
+          <a:bodyPr>
+            <a:normAutofit fontScale="90000"/>
           </a:bodyPr>
           <a:lstStyle/>
           <a:p>
-            <a:pPr marL="0" lvl="0" indent="0" algn="l" rtl="0">
-              <a:spcBef>
-                <a:spcPts val="0"/>
-              </a:spcBef>
-              <a:spcAft>
-                <a:spcPts val="0"/>
-              </a:spcAft>
+            <a:r>
+              <a:rPr lang="en-US" dirty="0"/>
+              <a:t>Phase changes</a:t>
+            </a:r>
+          </a:p>
+        </p:txBody>
+      </p:sp>
+      <p:sp>
+        <p:nvSpPr>
+          <p:cNvPr id="3" name="Text Placeholder 2">
+            <a:extLst>
+              <a:ext uri="{FF2B5EF4-FFF2-40B4-BE49-F238E27FC236}">
+                <a16:creationId xmlns:a16="http://schemas.microsoft.com/office/drawing/2014/main" id="{5DA9EAC7-4A3D-BC55-1205-12AC0ECA5567}"/>
+              </a:ext>
+            </a:extLst>
+          </p:cNvPr>
+          <p:cNvSpPr>
+            <a:spLocks noGrp="1"/>
+          </p:cNvSpPr>
+          <p:nvPr>
+            <p:ph type="body" idx="1"/>
+          </p:nvPr>
+        </p:nvSpPr>
+        <p:spPr>
+          <a:xfrm>
+            <a:off x="236285" y="901650"/>
+            <a:ext cx="8520600" cy="1173194"/>
+          </a:xfrm>
+        </p:spPr>
+        <p:txBody>
+          <a:bodyPr/>
+          <a:lstStyle/>
+          <a:p>
+            <a:pPr marL="114300" indent="0">
               <a:buNone/>
             </a:pPr>
             <a:r>
-              <a:rPr lang="en-GB" b="1" dirty="0">
-                <a:solidFill>
-                  <a:srgbClr val="202122"/>
-                </a:solidFill>
-                <a:highlight>
-                  <a:srgbClr val="FFFFFF"/>
-                </a:highlight>
-                <a:latin typeface="Source Code Pro"/>
-                <a:ea typeface="Source Code Pro"/>
-                <a:cs typeface="Source Code Pro"/>
-                <a:sym typeface="Source Code Pro"/>
+              <a:rPr lang="en-US" sz="1800" dirty="0">
+                <a:solidFill>
+                  <a:srgbClr val="56544F"/>
+                </a:solidFill>
+                <a:effectLst/>
+                <a:latin typeface="Times New Roman" panose="02020603050405020304" pitchFamily="18" charset="0"/>
+                <a:cs typeface="Times New Roman" panose="02020603050405020304" pitchFamily="18" charset="0"/>
               </a:rPr>
-              <a:t>T</a:t>
+              <a:t>The reflected </a:t>
             </a:r>
             <a:r>
-              <a:rPr lang="en-GB" b="1" dirty="0">
-                <a:solidFill>
-                  <a:srgbClr val="202122"/>
-                </a:solidFill>
-                <a:latin typeface="Source Code Pro"/>
-                <a:ea typeface="Source Code Pro"/>
-                <a:cs typeface="Source Code Pro"/>
-                <a:sym typeface="Source Code Pro"/>
+              <a:rPr lang="en-US" sz="1800" dirty="0">
+                <a:solidFill>
+                  <a:srgbClr val="6B6860"/>
+                </a:solidFill>
+                <a:effectLst/>
+                <a:latin typeface="Times New Roman" panose="02020603050405020304" pitchFamily="18" charset="0"/>
+                <a:cs typeface="Times New Roman" panose="02020603050405020304" pitchFamily="18" charset="0"/>
               </a:rPr>
-              <a:t>otal internal reflection</a:t>
+              <a:t>wave undergoes a </a:t>
             </a:r>
             <a:r>
-              <a:rPr lang="en-GB" dirty="0">
-                <a:solidFill>
-                  <a:srgbClr val="202122"/>
-                </a:solidFill>
-                <a:highlight>
-                  <a:srgbClr val="FFFFFF"/>
-                </a:highlight>
-                <a:latin typeface="Source Code Pro"/>
-                <a:ea typeface="Source Code Pro"/>
-                <a:cs typeface="Source Code Pro"/>
-                <a:sym typeface="Source Code Pro"/>
+              <a:rPr lang="en-US" sz="1800" dirty="0">
+                <a:solidFill>
+                  <a:srgbClr val="56544F"/>
+                </a:solidFill>
+                <a:effectLst/>
+                <a:latin typeface="Times New Roman" panose="02020603050405020304" pitchFamily="18" charset="0"/>
+                <a:cs typeface="Times New Roman" panose="02020603050405020304" pitchFamily="18" charset="0"/>
               </a:rPr>
-              <a:t> is the phenomenon in which </a:t>
+              <a:t>phase </a:t>
             </a:r>
             <a:r>
-              <a:rPr lang="en-GB" dirty="0">
-                <a:solidFill>
-                  <a:srgbClr val="202122"/>
-                </a:solidFill>
-                <a:latin typeface="Source Code Pro"/>
-                <a:ea typeface="Source Code Pro"/>
-                <a:cs typeface="Source Code Pro"/>
-                <a:sym typeface="Source Code Pro"/>
+              <a:rPr lang="en-US" sz="1800" dirty="0">
+                <a:solidFill>
+                  <a:srgbClr val="6B6860"/>
+                </a:solidFill>
+                <a:effectLst/>
+                <a:latin typeface="Times New Roman" panose="02020603050405020304" pitchFamily="18" charset="0"/>
+                <a:cs typeface="Times New Roman" panose="02020603050405020304" pitchFamily="18" charset="0"/>
               </a:rPr>
-              <a:t>waves</a:t>
+              <a:t>change </a:t>
             </a:r>
             <a:r>
-              <a:rPr lang="en-GB" dirty="0">
-                <a:solidFill>
-                  <a:srgbClr val="202122"/>
-                </a:solidFill>
-                <a:highlight>
-                  <a:srgbClr val="FFFFFF"/>
-                </a:highlight>
-                <a:latin typeface="Source Code Pro"/>
-                <a:ea typeface="Source Code Pro"/>
-                <a:cs typeface="Source Code Pro"/>
-                <a:sym typeface="Source Code Pro"/>
+              <a:rPr lang="en-US" sz="1800" dirty="0">
+                <a:solidFill>
+                  <a:srgbClr val="56544F"/>
+                </a:solidFill>
+                <a:effectLst/>
+                <a:latin typeface="Times New Roman" panose="02020603050405020304" pitchFamily="18" charset="0"/>
+                <a:cs typeface="Times New Roman" panose="02020603050405020304" pitchFamily="18" charset="0"/>
               </a:rPr>
-              <a:t> arriving at the </a:t>
+              <a:t>of </a:t>
             </a:r>
             <a:r>
-              <a:rPr lang="en-GB" dirty="0">
-                <a:solidFill>
-                  <a:srgbClr val="202122"/>
-                </a:solidFill>
-                <a:latin typeface="Source Code Pro"/>
-                <a:ea typeface="Source Code Pro"/>
-                <a:cs typeface="Source Code Pro"/>
-                <a:sym typeface="Source Code Pro"/>
+              <a:rPr lang="en-US" sz="1800" dirty="0">
+                <a:solidFill>
+                  <a:srgbClr val="47443F"/>
+                </a:solidFill>
+                <a:effectLst/>
+                <a:latin typeface="Times New Roman" panose="02020603050405020304" pitchFamily="18" charset="0"/>
+                <a:cs typeface="Times New Roman" panose="02020603050405020304" pitchFamily="18" charset="0"/>
               </a:rPr>
-              <a:t>interface</a:t>
+              <a:t>1</a:t>
             </a:r>
             <a:r>
-              <a:rPr lang="en-GB" dirty="0">
-                <a:solidFill>
-                  <a:srgbClr val="202122"/>
-                </a:solidFill>
-                <a:highlight>
-                  <a:srgbClr val="FFFFFF"/>
-                </a:highlight>
-                <a:latin typeface="Source Code Pro"/>
-                <a:ea typeface="Source Code Pro"/>
-                <a:cs typeface="Source Code Pro"/>
-                <a:sym typeface="Source Code Pro"/>
+              <a:rPr lang="en-US" dirty="0">
+                <a:solidFill>
+                  <a:srgbClr val="6B6860"/>
+                </a:solidFill>
+                <a:latin typeface="Times New Roman" panose="02020603050405020304" pitchFamily="18" charset="0"/>
+                <a:cs typeface="Times New Roman" panose="02020603050405020304" pitchFamily="18" charset="0"/>
               </a:rPr>
-              <a:t> (boundary) from one </a:t>
+              <a:t>80 degrees</a:t>
             </a:r>
             <a:r>
-              <a:rPr lang="en-GB" dirty="0">
-                <a:solidFill>
-                  <a:srgbClr val="202122"/>
-                </a:solidFill>
-                <a:latin typeface="Source Code Pro"/>
-                <a:ea typeface="Source Code Pro"/>
-                <a:cs typeface="Source Code Pro"/>
-                <a:sym typeface="Source Code Pro"/>
+              <a:rPr lang="en-US" sz="1800" dirty="0">
+                <a:solidFill>
+                  <a:srgbClr val="AAA596"/>
+                </a:solidFill>
+                <a:effectLst/>
+                <a:latin typeface="Times New Roman" panose="02020603050405020304" pitchFamily="18" charset="0"/>
+                <a:cs typeface="Times New Roman" panose="02020603050405020304" pitchFamily="18" charset="0"/>
               </a:rPr>
-              <a:t>medium</a:t>
+              <a:t> </a:t>
             </a:r>
             <a:r>
-              <a:rPr lang="en-GB" dirty="0">
-                <a:solidFill>
-                  <a:srgbClr val="202122"/>
-                </a:solidFill>
-                <a:highlight>
-                  <a:srgbClr val="FFFFFF"/>
-                </a:highlight>
-                <a:latin typeface="Source Code Pro"/>
-                <a:ea typeface="Source Code Pro"/>
-                <a:cs typeface="Source Code Pro"/>
-                <a:sym typeface="Source Code Pro"/>
+              <a:rPr lang="en-US" sz="1800" dirty="0">
+                <a:solidFill>
+                  <a:srgbClr val="6B6860"/>
+                </a:solidFill>
+                <a:effectLst/>
+                <a:latin typeface="Times New Roman" panose="02020603050405020304" pitchFamily="18" charset="0"/>
+                <a:cs typeface="Times New Roman" panose="02020603050405020304" pitchFamily="18" charset="0"/>
               </a:rPr>
-              <a:t> to another are not </a:t>
+              <a:t>w</a:t>
             </a:r>
             <a:r>
-              <a:rPr lang="en-GB" dirty="0">
-                <a:solidFill>
-                  <a:srgbClr val="202122"/>
-                </a:solidFill>
-                <a:latin typeface="Source Code Pro"/>
-                <a:ea typeface="Source Code Pro"/>
-                <a:cs typeface="Source Code Pro"/>
-                <a:sym typeface="Source Code Pro"/>
+              <a:rPr lang="en-US" sz="1800" dirty="0">
+                <a:solidFill>
+                  <a:srgbClr val="47443F"/>
+                </a:solidFill>
+                <a:effectLst/>
+                <a:latin typeface="Times New Roman" panose="02020603050405020304" pitchFamily="18" charset="0"/>
+                <a:cs typeface="Times New Roman" panose="02020603050405020304" pitchFamily="18" charset="0"/>
               </a:rPr>
-              <a:t>refracted</a:t>
+              <a:t>h</a:t>
             </a:r>
             <a:r>
-              <a:rPr lang="en-GB" dirty="0">
-                <a:solidFill>
-                  <a:srgbClr val="202122"/>
-                </a:solidFill>
-                <a:highlight>
-                  <a:srgbClr val="FFFFFF"/>
-                </a:highlight>
-                <a:latin typeface="Source Code Pro"/>
-                <a:ea typeface="Source Code Pro"/>
-                <a:cs typeface="Source Code Pro"/>
-                <a:sym typeface="Source Code Pro"/>
+              <a:rPr lang="en-US" sz="1800" dirty="0">
+                <a:solidFill>
+                  <a:srgbClr val="6B6860"/>
+                </a:solidFill>
+                <a:effectLst/>
+                <a:latin typeface="Times New Roman" panose="02020603050405020304" pitchFamily="18" charset="0"/>
+                <a:cs typeface="Times New Roman" panose="02020603050405020304" pitchFamily="18" charset="0"/>
               </a:rPr>
-              <a:t> into the second medium, but completely </a:t>
+              <a:t>e</a:t>
             </a:r>
             <a:r>
-              <a:rPr lang="en-GB" dirty="0">
-                <a:solidFill>
-                  <a:srgbClr val="202122"/>
-                </a:solidFill>
-                <a:latin typeface="Source Code Pro"/>
-                <a:ea typeface="Source Code Pro"/>
-                <a:cs typeface="Source Code Pro"/>
-                <a:sym typeface="Source Code Pro"/>
+              <a:rPr lang="en-US" sz="1800" dirty="0">
+                <a:solidFill>
+                  <a:srgbClr val="47443F"/>
+                </a:solidFill>
+                <a:effectLst/>
+                <a:latin typeface="Times New Roman" panose="02020603050405020304" pitchFamily="18" charset="0"/>
+                <a:cs typeface="Times New Roman" panose="02020603050405020304" pitchFamily="18" charset="0"/>
               </a:rPr>
-              <a:t>reflected</a:t>
+              <a:t>n </a:t>
             </a:r>
             <a:r>
-              <a:rPr lang="en-GB" dirty="0">
-                <a:solidFill>
-                  <a:srgbClr val="202122"/>
-                </a:solidFill>
-                <a:highlight>
-                  <a:srgbClr val="FFFFFF"/>
-                </a:highlight>
-                <a:latin typeface="Source Code Pro"/>
-                <a:ea typeface="Source Code Pro"/>
-                <a:cs typeface="Source Code Pro"/>
-                <a:sym typeface="Source Code Pro"/>
+              <a:rPr lang="en-US" sz="1800" dirty="0">
+                <a:solidFill>
+                  <a:srgbClr val="6B6860"/>
+                </a:solidFill>
+                <a:effectLst/>
+                <a:latin typeface="Times New Roman" panose="02020603050405020304" pitchFamily="18" charset="0"/>
+                <a:cs typeface="Times New Roman" panose="02020603050405020304" pitchFamily="18" charset="0"/>
               </a:rPr>
-              <a:t> back into the first medium.</a:t>
+              <a:t>the </a:t>
             </a:r>
-            <a:endParaRPr dirty="0">
-              <a:latin typeface="Source Code Pro"/>
-              <a:ea typeface="Source Code Pro"/>
-              <a:cs typeface="Source Code Pro"/>
-              <a:sym typeface="Source Code Pro"/>
+            <a:r>
+              <a:rPr lang="en-US" sz="1800" dirty="0">
+                <a:solidFill>
+                  <a:srgbClr val="47443F"/>
+                </a:solidFill>
+                <a:effectLst/>
+                <a:latin typeface="Times New Roman" panose="02020603050405020304" pitchFamily="18" charset="0"/>
+                <a:cs typeface="Times New Roman" panose="02020603050405020304" pitchFamily="18" charset="0"/>
+              </a:rPr>
+              <a:t>refl</a:t>
+            </a:r>
+            <a:r>
+              <a:rPr lang="en-US" sz="1800" dirty="0">
+                <a:solidFill>
+                  <a:srgbClr val="6B6860"/>
+                </a:solidFill>
+                <a:effectLst/>
+                <a:latin typeface="Times New Roman" panose="02020603050405020304" pitchFamily="18" charset="0"/>
+                <a:cs typeface="Times New Roman" panose="02020603050405020304" pitchFamily="18" charset="0"/>
+              </a:rPr>
+              <a:t>ect</a:t>
+            </a:r>
+            <a:r>
+              <a:rPr lang="en-US" sz="1800" dirty="0">
+                <a:solidFill>
+                  <a:srgbClr val="47443F"/>
+                </a:solidFill>
+                <a:effectLst/>
+                <a:latin typeface="Times New Roman" panose="02020603050405020304" pitchFamily="18" charset="0"/>
+                <a:cs typeface="Times New Roman" panose="02020603050405020304" pitchFamily="18" charset="0"/>
+              </a:rPr>
+              <a:t>ion </a:t>
+            </a:r>
+            <a:r>
+              <a:rPr lang="en-US" sz="1800" dirty="0">
+                <a:solidFill>
+                  <a:srgbClr val="6B6860"/>
+                </a:solidFill>
+                <a:effectLst/>
+                <a:latin typeface="Times New Roman" panose="02020603050405020304" pitchFamily="18" charset="0"/>
+                <a:cs typeface="Times New Roman" panose="02020603050405020304" pitchFamily="18" charset="0"/>
+              </a:rPr>
+              <a:t>occurs at </a:t>
+            </a:r>
+            <a:r>
+              <a:rPr lang="en-US" sz="1800" dirty="0">
+                <a:solidFill>
+                  <a:srgbClr val="56544F"/>
+                </a:solidFill>
+                <a:effectLst/>
+                <a:latin typeface="Times New Roman" panose="02020603050405020304" pitchFamily="18" charset="0"/>
+                <a:cs typeface="Times New Roman" panose="02020603050405020304" pitchFamily="18" charset="0"/>
+              </a:rPr>
+              <a:t>a </a:t>
+            </a:r>
+            <a:r>
+              <a:rPr lang="en-US" sz="1800" dirty="0">
+                <a:solidFill>
+                  <a:srgbClr val="6B6860"/>
+                </a:solidFill>
+                <a:effectLst/>
+                <a:latin typeface="Times New Roman" panose="02020603050405020304" pitchFamily="18" charset="0"/>
+                <a:cs typeface="Times New Roman" panose="02020603050405020304" pitchFamily="18" charset="0"/>
+              </a:rPr>
+              <a:t>ju</a:t>
+            </a:r>
+            <a:r>
+              <a:rPr lang="en-US" sz="1800" dirty="0">
+                <a:solidFill>
+                  <a:srgbClr val="383333"/>
+                </a:solidFill>
+                <a:effectLst/>
+                <a:latin typeface="Times New Roman" panose="02020603050405020304" pitchFamily="18" charset="0"/>
+                <a:cs typeface="Times New Roman" panose="02020603050405020304" pitchFamily="18" charset="0"/>
+              </a:rPr>
+              <a:t>n</a:t>
+            </a:r>
+            <a:r>
+              <a:rPr lang="en-US" sz="1800" dirty="0">
+                <a:solidFill>
+                  <a:srgbClr val="56544F"/>
+                </a:solidFill>
+                <a:effectLst/>
+                <a:latin typeface="Times New Roman" panose="02020603050405020304" pitchFamily="18" charset="0"/>
+                <a:cs typeface="Times New Roman" panose="02020603050405020304" pitchFamily="18" charset="0"/>
+              </a:rPr>
+              <a:t>ct</a:t>
+            </a:r>
+            <a:r>
+              <a:rPr lang="en-US" sz="1800" dirty="0">
+                <a:solidFill>
+                  <a:srgbClr val="383333"/>
+                </a:solidFill>
+                <a:effectLst/>
+                <a:latin typeface="Times New Roman" panose="02020603050405020304" pitchFamily="18" charset="0"/>
+                <a:cs typeface="Times New Roman" panose="02020603050405020304" pitchFamily="18" charset="0"/>
+              </a:rPr>
+              <a:t>i</a:t>
+            </a:r>
+            <a:r>
+              <a:rPr lang="en-US" sz="1800" dirty="0">
+                <a:solidFill>
+                  <a:srgbClr val="56544F"/>
+                </a:solidFill>
+                <a:effectLst/>
+                <a:latin typeface="Times New Roman" panose="02020603050405020304" pitchFamily="18" charset="0"/>
+                <a:cs typeface="Times New Roman" panose="02020603050405020304" pitchFamily="18" charset="0"/>
+              </a:rPr>
+              <a:t>on w</a:t>
+            </a:r>
+            <a:r>
+              <a:rPr lang="en-US" sz="1800" dirty="0">
+                <a:solidFill>
+                  <a:srgbClr val="383333"/>
+                </a:solidFill>
+                <a:effectLst/>
+                <a:latin typeface="Times New Roman" panose="02020603050405020304" pitchFamily="18" charset="0"/>
+                <a:cs typeface="Times New Roman" panose="02020603050405020304" pitchFamily="18" charset="0"/>
+              </a:rPr>
+              <a:t>h</a:t>
+            </a:r>
+            <a:r>
+              <a:rPr lang="en-US" sz="1800" dirty="0">
+                <a:solidFill>
+                  <a:srgbClr val="56544F"/>
+                </a:solidFill>
+                <a:effectLst/>
+                <a:latin typeface="Times New Roman" panose="02020603050405020304" pitchFamily="18" charset="0"/>
+                <a:cs typeface="Times New Roman" panose="02020603050405020304" pitchFamily="18" charset="0"/>
+              </a:rPr>
+              <a:t>ere the </a:t>
+            </a:r>
+            <a:r>
+              <a:rPr lang="en-US" sz="1800" dirty="0">
+                <a:solidFill>
+                  <a:srgbClr val="47443F"/>
+                </a:solidFill>
+                <a:effectLst/>
+                <a:latin typeface="Times New Roman" panose="02020603050405020304" pitchFamily="18" charset="0"/>
+                <a:cs typeface="Times New Roman" panose="02020603050405020304" pitchFamily="18" charset="0"/>
+              </a:rPr>
+              <a:t>tran</a:t>
+            </a:r>
+            <a:r>
+              <a:rPr lang="en-US" sz="1800" dirty="0">
+                <a:solidFill>
+                  <a:srgbClr val="6B6860"/>
+                </a:solidFill>
+                <a:effectLst/>
+                <a:latin typeface="Times New Roman" panose="02020603050405020304" pitchFamily="18" charset="0"/>
+                <a:cs typeface="Times New Roman" panose="02020603050405020304" pitchFamily="18" charset="0"/>
+              </a:rPr>
+              <a:t>s</a:t>
+            </a:r>
+            <a:r>
+              <a:rPr lang="en-US" sz="1800" dirty="0">
+                <a:solidFill>
+                  <a:srgbClr val="232121"/>
+                </a:solidFill>
+                <a:effectLst/>
+                <a:latin typeface="Times New Roman" panose="02020603050405020304" pitchFamily="18" charset="0"/>
+                <a:cs typeface="Times New Roman" panose="02020603050405020304" pitchFamily="18" charset="0"/>
+              </a:rPr>
+              <a:t>m</a:t>
+            </a:r>
+            <a:r>
+              <a:rPr lang="en-US" sz="1800" dirty="0">
+                <a:solidFill>
+                  <a:srgbClr val="47443F"/>
+                </a:solidFill>
+                <a:effectLst/>
+                <a:latin typeface="Times New Roman" panose="02020603050405020304" pitchFamily="18" charset="0"/>
+                <a:cs typeface="Times New Roman" panose="02020603050405020304" pitchFamily="18" charset="0"/>
+              </a:rPr>
+              <a:t>itted </a:t>
+            </a:r>
+            <a:r>
+              <a:rPr lang="en-US" sz="1800" dirty="0">
+                <a:solidFill>
+                  <a:srgbClr val="56544F"/>
+                </a:solidFill>
+                <a:effectLst/>
+                <a:latin typeface="Times New Roman" panose="02020603050405020304" pitchFamily="18" charset="0"/>
+                <a:cs typeface="Times New Roman" panose="02020603050405020304" pitchFamily="18" charset="0"/>
+              </a:rPr>
+              <a:t>wave </a:t>
+            </a:r>
+            <a:r>
+              <a:rPr lang="en-US" sz="1800" dirty="0">
+                <a:solidFill>
+                  <a:srgbClr val="6B6860"/>
+                </a:solidFill>
+                <a:effectLst/>
+                <a:latin typeface="Times New Roman" panose="02020603050405020304" pitchFamily="18" charset="0"/>
+                <a:cs typeface="Times New Roman" panose="02020603050405020304" pitchFamily="18" charset="0"/>
+              </a:rPr>
+              <a:t>s</a:t>
+            </a:r>
+            <a:r>
+              <a:rPr lang="en-US" sz="1800" dirty="0">
+                <a:solidFill>
+                  <a:srgbClr val="47443F"/>
+                </a:solidFill>
+                <a:effectLst/>
+                <a:latin typeface="Times New Roman" panose="02020603050405020304" pitchFamily="18" charset="0"/>
+                <a:cs typeface="Times New Roman" panose="02020603050405020304" pitchFamily="18" charset="0"/>
+              </a:rPr>
+              <a:t>l</a:t>
+            </a:r>
+            <a:r>
+              <a:rPr lang="en-US" sz="1800" dirty="0">
+                <a:solidFill>
+                  <a:srgbClr val="6B6860"/>
+                </a:solidFill>
+                <a:effectLst/>
+                <a:latin typeface="Times New Roman" panose="02020603050405020304" pitchFamily="18" charset="0"/>
+                <a:cs typeface="Times New Roman" panose="02020603050405020304" pitchFamily="18" charset="0"/>
+              </a:rPr>
+              <a:t>ows </a:t>
+            </a:r>
+            <a:r>
+              <a:rPr lang="en-US" sz="1800" dirty="0">
+                <a:solidFill>
+                  <a:srgbClr val="47443F"/>
+                </a:solidFill>
+                <a:effectLst/>
+                <a:latin typeface="Times New Roman" panose="02020603050405020304" pitchFamily="18" charset="0"/>
+                <a:cs typeface="Times New Roman" panose="02020603050405020304" pitchFamily="18" charset="0"/>
+              </a:rPr>
+              <a:t>d</a:t>
+            </a:r>
+            <a:r>
+              <a:rPr lang="en-US" sz="1800" dirty="0">
+                <a:solidFill>
+                  <a:srgbClr val="6B6860"/>
+                </a:solidFill>
+                <a:effectLst/>
+                <a:latin typeface="Times New Roman" panose="02020603050405020304" pitchFamily="18" charset="0"/>
+                <a:cs typeface="Times New Roman" panose="02020603050405020304" pitchFamily="18" charset="0"/>
+              </a:rPr>
+              <a:t>ow</a:t>
+            </a:r>
+            <a:r>
+              <a:rPr lang="en-US" sz="1800" dirty="0">
+                <a:solidFill>
+                  <a:srgbClr val="383333"/>
+                </a:solidFill>
+                <a:effectLst/>
+                <a:latin typeface="Times New Roman" panose="02020603050405020304" pitchFamily="18" charset="0"/>
+                <a:cs typeface="Times New Roman" panose="02020603050405020304" pitchFamily="18" charset="0"/>
+              </a:rPr>
+              <a:t>n</a:t>
+            </a:r>
+            <a:r>
+              <a:rPr lang="en-US" sz="1800" dirty="0">
+                <a:solidFill>
+                  <a:srgbClr val="56544F"/>
+                </a:solidFill>
+                <a:effectLst/>
+                <a:latin typeface="Times New Roman" panose="02020603050405020304" pitchFamily="18" charset="0"/>
+                <a:cs typeface="Times New Roman" panose="02020603050405020304" pitchFamily="18" charset="0"/>
+              </a:rPr>
+              <a:t>. </a:t>
+            </a:r>
+            <a:r>
+              <a:rPr lang="en-US" sz="1800" dirty="0">
+                <a:solidFill>
+                  <a:srgbClr val="47443F"/>
+                </a:solidFill>
+                <a:effectLst/>
+                <a:latin typeface="Times New Roman" panose="02020603050405020304" pitchFamily="18" charset="0"/>
+                <a:cs typeface="Times New Roman" panose="02020603050405020304" pitchFamily="18" charset="0"/>
+              </a:rPr>
+              <a:t>When </a:t>
+            </a:r>
+            <a:r>
+              <a:rPr lang="en-US" sz="1800" dirty="0">
+                <a:solidFill>
+                  <a:srgbClr val="56544F"/>
+                </a:solidFill>
+                <a:effectLst/>
+                <a:latin typeface="Times New Roman" panose="02020603050405020304" pitchFamily="18" charset="0"/>
+                <a:cs typeface="Times New Roman" panose="02020603050405020304" pitchFamily="18" charset="0"/>
+              </a:rPr>
+              <a:t>t</a:t>
+            </a:r>
+            <a:r>
+              <a:rPr lang="en-US" sz="1800" dirty="0">
+                <a:solidFill>
+                  <a:srgbClr val="383333"/>
+                </a:solidFill>
+                <a:effectLst/>
+                <a:latin typeface="Times New Roman" panose="02020603050405020304" pitchFamily="18" charset="0"/>
+                <a:cs typeface="Times New Roman" panose="02020603050405020304" pitchFamily="18" charset="0"/>
+              </a:rPr>
+              <a:t>h</a:t>
+            </a:r>
+            <a:r>
+              <a:rPr lang="en-US" sz="1800" dirty="0">
+                <a:solidFill>
+                  <a:srgbClr val="56544F"/>
+                </a:solidFill>
+                <a:effectLst/>
+                <a:latin typeface="Times New Roman" panose="02020603050405020304" pitchFamily="18" charset="0"/>
+                <a:cs typeface="Times New Roman" panose="02020603050405020304" pitchFamily="18" charset="0"/>
+              </a:rPr>
+              <a:t>e </a:t>
+            </a:r>
+            <a:r>
+              <a:rPr lang="en-US" sz="1800" dirty="0">
+                <a:solidFill>
+                  <a:srgbClr val="47443F"/>
+                </a:solidFill>
+                <a:effectLst/>
+                <a:latin typeface="Times New Roman" panose="02020603050405020304" pitchFamily="18" charset="0"/>
+                <a:cs typeface="Times New Roman" panose="02020603050405020304" pitchFamily="18" charset="0"/>
+              </a:rPr>
+              <a:t>tran</a:t>
+            </a:r>
+            <a:r>
+              <a:rPr lang="en-US" sz="1800" dirty="0">
+                <a:solidFill>
+                  <a:srgbClr val="6B6860"/>
+                </a:solidFill>
+                <a:effectLst/>
+                <a:latin typeface="Times New Roman" panose="02020603050405020304" pitchFamily="18" charset="0"/>
+                <a:cs typeface="Times New Roman" panose="02020603050405020304" pitchFamily="18" charset="0"/>
+              </a:rPr>
+              <a:t>sm</a:t>
+            </a:r>
+            <a:r>
+              <a:rPr lang="en-US" sz="1800" dirty="0">
+                <a:solidFill>
+                  <a:srgbClr val="47443F"/>
+                </a:solidFill>
+                <a:effectLst/>
+                <a:latin typeface="Times New Roman" panose="02020603050405020304" pitchFamily="18" charset="0"/>
+                <a:cs typeface="Times New Roman" panose="02020603050405020304" pitchFamily="18" charset="0"/>
+              </a:rPr>
+              <a:t>itt</a:t>
+            </a:r>
+            <a:r>
+              <a:rPr lang="en-US" sz="1800" dirty="0">
+                <a:solidFill>
+                  <a:srgbClr val="6B6860"/>
+                </a:solidFill>
+                <a:effectLst/>
+                <a:latin typeface="Times New Roman" panose="02020603050405020304" pitchFamily="18" charset="0"/>
+                <a:cs typeface="Times New Roman" panose="02020603050405020304" pitchFamily="18" charset="0"/>
+              </a:rPr>
+              <a:t>e</a:t>
+            </a:r>
+            <a:r>
+              <a:rPr lang="en-US" sz="1800" dirty="0">
+                <a:solidFill>
+                  <a:srgbClr val="47443F"/>
+                </a:solidFill>
+                <a:effectLst/>
+                <a:latin typeface="Times New Roman" panose="02020603050405020304" pitchFamily="18" charset="0"/>
+                <a:cs typeface="Times New Roman" panose="02020603050405020304" pitchFamily="18" charset="0"/>
+              </a:rPr>
+              <a:t>d </a:t>
+            </a:r>
+            <a:r>
+              <a:rPr lang="en-US" sz="1800" dirty="0">
+                <a:solidFill>
+                  <a:srgbClr val="6B6860"/>
+                </a:solidFill>
+                <a:effectLst/>
+                <a:latin typeface="Times New Roman" panose="02020603050405020304" pitchFamily="18" charset="0"/>
+                <a:cs typeface="Times New Roman" panose="02020603050405020304" pitchFamily="18" charset="0"/>
+              </a:rPr>
+              <a:t>wave spee</a:t>
+            </a:r>
+            <a:r>
+              <a:rPr lang="en-US" sz="1800" dirty="0">
+                <a:solidFill>
+                  <a:srgbClr val="47443F"/>
+                </a:solidFill>
+                <a:effectLst/>
+                <a:latin typeface="Times New Roman" panose="02020603050405020304" pitchFamily="18" charset="0"/>
+                <a:cs typeface="Times New Roman" panose="02020603050405020304" pitchFamily="18" charset="0"/>
+              </a:rPr>
+              <a:t>d</a:t>
+            </a:r>
+            <a:r>
+              <a:rPr lang="en-US" sz="1800" dirty="0">
+                <a:solidFill>
+                  <a:srgbClr val="6B6860"/>
+                </a:solidFill>
+                <a:effectLst/>
+                <a:latin typeface="Times New Roman" panose="02020603050405020304" pitchFamily="18" charset="0"/>
+                <a:cs typeface="Times New Roman" panose="02020603050405020304" pitchFamily="18" charset="0"/>
+              </a:rPr>
+              <a:t>s </a:t>
+            </a:r>
+            <a:r>
+              <a:rPr lang="en-US" sz="1800" dirty="0">
+                <a:solidFill>
+                  <a:srgbClr val="56544F"/>
+                </a:solidFill>
+                <a:effectLst/>
+                <a:latin typeface="Times New Roman" panose="02020603050405020304" pitchFamily="18" charset="0"/>
+                <a:cs typeface="Times New Roman" panose="02020603050405020304" pitchFamily="18" charset="0"/>
+              </a:rPr>
+              <a:t>up </a:t>
+            </a:r>
+            <a:r>
+              <a:rPr lang="en-US" sz="1800" dirty="0">
+                <a:solidFill>
+                  <a:srgbClr val="6B6860"/>
+                </a:solidFill>
+                <a:effectLst/>
+                <a:latin typeface="Times New Roman" panose="02020603050405020304" pitchFamily="18" charset="0"/>
+                <a:cs typeface="Times New Roman" panose="02020603050405020304" pitchFamily="18" charset="0"/>
+              </a:rPr>
+              <a:t>at the junction, </a:t>
+            </a:r>
+            <a:r>
+              <a:rPr lang="en-US" sz="1800" dirty="0">
+                <a:solidFill>
+                  <a:srgbClr val="47443F"/>
+                </a:solidFill>
+                <a:effectLst/>
+                <a:latin typeface="Times New Roman" panose="02020603050405020304" pitchFamily="18" charset="0"/>
+                <a:cs typeface="Times New Roman" panose="02020603050405020304" pitchFamily="18" charset="0"/>
+              </a:rPr>
+              <a:t>th</a:t>
+            </a:r>
+            <a:r>
+              <a:rPr lang="en-US" sz="1800" dirty="0">
+                <a:solidFill>
+                  <a:srgbClr val="7F7C72"/>
+                </a:solidFill>
+                <a:effectLst/>
+                <a:latin typeface="Times New Roman" panose="02020603050405020304" pitchFamily="18" charset="0"/>
+                <a:cs typeface="Times New Roman" panose="02020603050405020304" pitchFamily="18" charset="0"/>
+              </a:rPr>
+              <a:t>e</a:t>
+            </a:r>
+            <a:r>
+              <a:rPr lang="en-US" sz="1800" dirty="0">
+                <a:solidFill>
+                  <a:srgbClr val="47443F"/>
+                </a:solidFill>
+                <a:effectLst/>
+                <a:latin typeface="Times New Roman" panose="02020603050405020304" pitchFamily="18" charset="0"/>
+                <a:cs typeface="Times New Roman" panose="02020603050405020304" pitchFamily="18" charset="0"/>
+              </a:rPr>
+              <a:t>r</a:t>
+            </a:r>
+            <a:r>
+              <a:rPr lang="en-US" sz="1800" dirty="0">
+                <a:solidFill>
+                  <a:srgbClr val="6B6860"/>
+                </a:solidFill>
+                <a:effectLst/>
+                <a:latin typeface="Times New Roman" panose="02020603050405020304" pitchFamily="18" charset="0"/>
+                <a:cs typeface="Times New Roman" panose="02020603050405020304" pitchFamily="18" charset="0"/>
+              </a:rPr>
+              <a:t>e </a:t>
+            </a:r>
+            <a:r>
+              <a:rPr lang="en-US" sz="1800" dirty="0">
+                <a:solidFill>
+                  <a:srgbClr val="56544F"/>
+                </a:solidFill>
+                <a:effectLst/>
+                <a:latin typeface="Times New Roman" panose="02020603050405020304" pitchFamily="18" charset="0"/>
+                <a:cs typeface="Times New Roman" panose="02020603050405020304" pitchFamily="18" charset="0"/>
+              </a:rPr>
+              <a:t>i</a:t>
+            </a:r>
+            <a:r>
+              <a:rPr lang="en-US" sz="1800" dirty="0">
+                <a:solidFill>
+                  <a:srgbClr val="7F7C72"/>
+                </a:solidFill>
+                <a:effectLst/>
+                <a:latin typeface="Times New Roman" panose="02020603050405020304" pitchFamily="18" charset="0"/>
+                <a:cs typeface="Times New Roman" panose="02020603050405020304" pitchFamily="18" charset="0"/>
+              </a:rPr>
+              <a:t>s </a:t>
+            </a:r>
+            <a:r>
+              <a:rPr lang="en-US" sz="1800" dirty="0">
+                <a:solidFill>
+                  <a:srgbClr val="56544F"/>
+                </a:solidFill>
+                <a:effectLst/>
+                <a:latin typeface="Times New Roman" panose="02020603050405020304" pitchFamily="18" charset="0"/>
+                <a:cs typeface="Times New Roman" panose="02020603050405020304" pitchFamily="18" charset="0"/>
+              </a:rPr>
+              <a:t>no </a:t>
+            </a:r>
+            <a:r>
+              <a:rPr lang="en-US" sz="1800" dirty="0">
+                <a:solidFill>
+                  <a:srgbClr val="6B6860"/>
+                </a:solidFill>
+                <a:effectLst/>
+                <a:latin typeface="Times New Roman" panose="02020603050405020304" pitchFamily="18" charset="0"/>
+                <a:cs typeface="Times New Roman" panose="02020603050405020304" pitchFamily="18" charset="0"/>
+              </a:rPr>
+              <a:t>phase c</a:t>
+            </a:r>
+            <a:r>
+              <a:rPr lang="en-US" sz="1800" dirty="0">
+                <a:solidFill>
+                  <a:srgbClr val="47443F"/>
+                </a:solidFill>
+                <a:effectLst/>
+                <a:latin typeface="Times New Roman" panose="02020603050405020304" pitchFamily="18" charset="0"/>
+                <a:cs typeface="Times New Roman" panose="02020603050405020304" pitchFamily="18" charset="0"/>
+              </a:rPr>
+              <a:t>h</a:t>
+            </a:r>
+            <a:r>
+              <a:rPr lang="en-US" sz="1800" dirty="0">
+                <a:solidFill>
+                  <a:srgbClr val="6B6860"/>
+                </a:solidFill>
+                <a:effectLst/>
+                <a:latin typeface="Times New Roman" panose="02020603050405020304" pitchFamily="18" charset="0"/>
+                <a:cs typeface="Times New Roman" panose="02020603050405020304" pitchFamily="18" charset="0"/>
+              </a:rPr>
+              <a:t>ange </a:t>
+            </a:r>
+            <a:r>
+              <a:rPr lang="en-US" sz="1800" dirty="0">
+                <a:solidFill>
+                  <a:srgbClr val="56544F"/>
+                </a:solidFill>
+                <a:effectLst/>
+                <a:latin typeface="Times New Roman" panose="02020603050405020304" pitchFamily="18" charset="0"/>
+                <a:cs typeface="Times New Roman" panose="02020603050405020304" pitchFamily="18" charset="0"/>
+              </a:rPr>
+              <a:t>upon reflection.</a:t>
+            </a:r>
+            <a:endParaRPr lang="en-US" dirty="0">
+              <a:latin typeface="Times New Roman" panose="02020603050405020304" pitchFamily="18" charset="0"/>
+              <a:cs typeface="Times New Roman" panose="02020603050405020304" pitchFamily="18" charset="0"/>
+            </a:endParaRPr>
+          </a:p>
+          <a:p>
+            <a:pPr marL="114300" indent="0">
+              <a:buNone/>
+            </a:pPr>
+            <a:endParaRPr lang="en-US" dirty="0">
+              <a:latin typeface="Times New Roman" panose="02020603050405020304" pitchFamily="18" charset="0"/>
+              <a:cs typeface="Times New Roman" panose="02020603050405020304" pitchFamily="18" charset="0"/>
             </a:endParaRPr>
           </a:p>
         </p:txBody>
       </p:sp>
+      <p:pic>
+        <p:nvPicPr>
+          <p:cNvPr id="4" name="Picture 3">
+            <a:extLst>
+              <a:ext uri="{FF2B5EF4-FFF2-40B4-BE49-F238E27FC236}">
+                <a16:creationId xmlns:a16="http://schemas.microsoft.com/office/drawing/2014/main" id="{6F0E6E16-59DA-0401-93FC-C51214C1AE7A}"/>
+              </a:ext>
+            </a:extLst>
+          </p:cNvPr>
+          <p:cNvPicPr>
+            <a:picLocks noChangeAspect="1"/>
+          </p:cNvPicPr>
+          <p:nvPr/>
+        </p:nvPicPr>
+        <p:blipFill>
+          <a:blip r:embed="rId2"/>
+          <a:stretch>
+            <a:fillRect/>
+          </a:stretch>
+        </p:blipFill>
+        <p:spPr>
+          <a:xfrm>
+            <a:off x="527900" y="2074844"/>
+            <a:ext cx="3667027" cy="2957767"/>
+          </a:xfrm>
+          <a:prstGeom prst="rect">
+            <a:avLst/>
+          </a:prstGeom>
+        </p:spPr>
+      </p:pic>
     </p:spTree>
+    <p:extLst>
+      <p:ext uri="{BB962C8B-B14F-4D97-AF65-F5344CB8AC3E}">
+        <p14:creationId xmlns:p14="http://schemas.microsoft.com/office/powerpoint/2010/main" val="2241476756"/>
+      </p:ext>
+    </p:extLst>
   </p:cSld>
   <p:clrMapOvr>
     <a:masterClrMapping/>
@@ -11343,6 +12269,424 @@
       <p:bldP spid="66" grpId="0"/>
     </p:bldLst>
   </p:timing>
+</p:sld>
+</file>
+
+<file path=ppt/slides/slide20.xml><?xml version="1.0" encoding="utf-8"?>
+<p:sld xmlns:a="http://schemas.openxmlformats.org/drawingml/2006/main" xmlns:r="http://schemas.openxmlformats.org/officeDocument/2006/relationships" xmlns:p="http://schemas.openxmlformats.org/presentationml/2006/main">
+  <p:cSld>
+    <p:spTree>
+      <p:nvGrpSpPr>
+        <p:cNvPr id="1" name="Shape 189"/>
+        <p:cNvGrpSpPr/>
+        <p:nvPr/>
+      </p:nvGrpSpPr>
+      <p:grpSpPr>
+        <a:xfrm>
+          <a:off x="0" y="0"/>
+          <a:ext cx="0" cy="0"/>
+          <a:chOff x="0" y="0"/>
+          <a:chExt cx="0" cy="0"/>
+        </a:xfrm>
+      </p:grpSpPr>
+      <p:sp>
+        <p:nvSpPr>
+          <p:cNvPr id="190" name="Google Shape;190;p28"/>
+          <p:cNvSpPr txBox="1">
+            <a:spLocks noGrp="1"/>
+          </p:cNvSpPr>
+          <p:nvPr>
+            <p:ph type="title"/>
+          </p:nvPr>
+        </p:nvSpPr>
+        <p:spPr>
+          <a:xfrm>
+            <a:off x="166325" y="78250"/>
+            <a:ext cx="8520600" cy="801000"/>
+          </a:xfrm>
+          <a:prstGeom prst="rect">
+            <a:avLst/>
+          </a:prstGeom>
+        </p:spPr>
+        <p:txBody>
+          <a:bodyPr spcFirstLastPara="1" wrap="square" lIns="91425" tIns="91425" rIns="91425" bIns="91425" anchor="t" anchorCtr="0">
+            <a:normAutofit fontScale="90000"/>
+          </a:bodyPr>
+          <a:lstStyle/>
+          <a:p>
+            <a:pPr marL="0" lvl="0" indent="0" algn="l" rtl="0">
+              <a:spcBef>
+                <a:spcPts val="0"/>
+              </a:spcBef>
+              <a:spcAft>
+                <a:spcPts val="0"/>
+              </a:spcAft>
+              <a:buNone/>
+            </a:pPr>
+            <a:r>
+              <a:rPr lang="en-GB"/>
+              <a:t>VISUALIZations</a:t>
+            </a:r>
+            <a:endParaRPr/>
+          </a:p>
+          <a:p>
+            <a:pPr marL="0" lvl="0" indent="0" algn="l" rtl="0">
+              <a:spcBef>
+                <a:spcPts val="0"/>
+              </a:spcBef>
+              <a:spcAft>
+                <a:spcPts val="0"/>
+              </a:spcAft>
+              <a:buNone/>
+            </a:pPr>
+            <a:endParaRPr/>
+          </a:p>
+          <a:p>
+            <a:pPr marL="0" lvl="0" indent="0" algn="l" rtl="0">
+              <a:spcBef>
+                <a:spcPts val="0"/>
+              </a:spcBef>
+              <a:spcAft>
+                <a:spcPts val="0"/>
+              </a:spcAft>
+              <a:buNone/>
+            </a:pPr>
+            <a:endParaRPr/>
+          </a:p>
+        </p:txBody>
+      </p:sp>
+      <p:pic>
+        <p:nvPicPr>
+          <p:cNvPr id="191" name="Google Shape;191;p28"/>
+          <p:cNvPicPr preferRelativeResize="0"/>
+          <p:nvPr/>
+        </p:nvPicPr>
+        <p:blipFill>
+          <a:blip r:embed="rId3">
+            <a:alphaModFix/>
+          </a:blip>
+          <a:stretch>
+            <a:fillRect/>
+          </a:stretch>
+        </p:blipFill>
+        <p:spPr>
+          <a:xfrm>
+            <a:off x="4983325" y="659313"/>
+            <a:ext cx="3911276" cy="3911276"/>
+          </a:xfrm>
+          <a:prstGeom prst="rect">
+            <a:avLst/>
+          </a:prstGeom>
+          <a:noFill/>
+          <a:ln>
+            <a:noFill/>
+          </a:ln>
+        </p:spPr>
+      </p:pic>
+      <p:sp>
+        <p:nvSpPr>
+          <p:cNvPr id="192" name="Google Shape;192;p28"/>
+          <p:cNvSpPr txBox="1"/>
+          <p:nvPr/>
+        </p:nvSpPr>
+        <p:spPr>
+          <a:xfrm>
+            <a:off x="186900" y="996850"/>
+            <a:ext cx="3800400" cy="1453800"/>
+          </a:xfrm>
+          <a:prstGeom prst="rect">
+            <a:avLst/>
+          </a:prstGeom>
+          <a:noFill/>
+          <a:ln>
+            <a:noFill/>
+          </a:ln>
+        </p:spPr>
+        <p:txBody>
+          <a:bodyPr spcFirstLastPara="1" wrap="square" lIns="91425" tIns="91425" rIns="91425" bIns="91425" anchor="t" anchorCtr="0">
+            <a:noAutofit/>
+          </a:bodyPr>
+          <a:lstStyle/>
+          <a:p>
+            <a:pPr marL="0" lvl="0" indent="0" algn="l" rtl="0">
+              <a:spcBef>
+                <a:spcPts val="0"/>
+              </a:spcBef>
+              <a:spcAft>
+                <a:spcPts val="0"/>
+              </a:spcAft>
+              <a:buNone/>
+            </a:pPr>
+            <a:r>
+              <a:rPr lang="en-GB" b="1">
+                <a:latin typeface="Source Code Pro"/>
+                <a:ea typeface="Source Code Pro"/>
+                <a:cs typeface="Source Code Pro"/>
+                <a:sym typeface="Source Code Pro"/>
+              </a:rPr>
+              <a:t>Internal reflection</a:t>
+            </a:r>
+            <a:r>
+              <a:rPr lang="en-GB">
+                <a:latin typeface="Source Code Pro"/>
+                <a:ea typeface="Source Code Pro"/>
+                <a:cs typeface="Source Code Pro"/>
+                <a:sym typeface="Source Code Pro"/>
+              </a:rPr>
+              <a:t> (glass-to-air). Note that r_TE reaches a maximum at 0.73 radians which is the critical angle at which </a:t>
+            </a:r>
+            <a:r>
+              <a:rPr lang="en-GB" i="1">
+                <a:latin typeface="Source Code Pro"/>
+                <a:ea typeface="Source Code Pro"/>
+                <a:cs typeface="Source Code Pro"/>
+                <a:sym typeface="Source Code Pro"/>
+              </a:rPr>
+              <a:t>total internal reflection occurs</a:t>
+            </a:r>
+            <a:r>
+              <a:rPr lang="en-GB">
+                <a:latin typeface="Source Code Pro"/>
+                <a:ea typeface="Source Code Pro"/>
+                <a:cs typeface="Source Code Pro"/>
+                <a:sym typeface="Source Code Pro"/>
+              </a:rPr>
+              <a:t>.</a:t>
+            </a:r>
+            <a:endParaRPr>
+              <a:latin typeface="Source Code Pro"/>
+              <a:ea typeface="Source Code Pro"/>
+              <a:cs typeface="Source Code Pro"/>
+              <a:sym typeface="Source Code Pro"/>
+            </a:endParaRPr>
+          </a:p>
+        </p:txBody>
+      </p:sp>
+      <p:sp>
+        <p:nvSpPr>
+          <p:cNvPr id="193" name="Google Shape;193;p28"/>
+          <p:cNvSpPr txBox="1"/>
+          <p:nvPr/>
+        </p:nvSpPr>
+        <p:spPr>
+          <a:xfrm>
+            <a:off x="214600" y="2450650"/>
+            <a:ext cx="3946076" cy="1696000"/>
+          </a:xfrm>
+          <a:prstGeom prst="rect">
+            <a:avLst/>
+          </a:prstGeom>
+          <a:noFill/>
+          <a:ln>
+            <a:noFill/>
+          </a:ln>
+        </p:spPr>
+        <p:txBody>
+          <a:bodyPr spcFirstLastPara="1" wrap="square" lIns="91425" tIns="91425" rIns="91425" bIns="91425" anchor="t" anchorCtr="0">
+            <a:noAutofit/>
+          </a:bodyPr>
+          <a:lstStyle/>
+          <a:p>
+            <a:pPr marL="0" lvl="0" indent="0" algn="l" rtl="0">
+              <a:spcBef>
+                <a:spcPts val="0"/>
+              </a:spcBef>
+              <a:spcAft>
+                <a:spcPts val="0"/>
+              </a:spcAft>
+              <a:buNone/>
+            </a:pPr>
+            <a:r>
+              <a:rPr lang="en-GB" b="1" dirty="0">
+                <a:solidFill>
+                  <a:srgbClr val="202122"/>
+                </a:solidFill>
+                <a:highlight>
+                  <a:srgbClr val="FFFFFF"/>
+                </a:highlight>
+                <a:latin typeface="Source Code Pro"/>
+                <a:ea typeface="Source Code Pro"/>
+                <a:cs typeface="Source Code Pro"/>
+                <a:sym typeface="Source Code Pro"/>
+              </a:rPr>
+              <a:t>T</a:t>
+            </a:r>
+            <a:r>
+              <a:rPr lang="en-GB" b="1" dirty="0">
+                <a:solidFill>
+                  <a:srgbClr val="202122"/>
+                </a:solidFill>
+                <a:latin typeface="Source Code Pro"/>
+                <a:ea typeface="Source Code Pro"/>
+                <a:cs typeface="Source Code Pro"/>
+                <a:sym typeface="Source Code Pro"/>
+              </a:rPr>
+              <a:t>otal internal reflection</a:t>
+            </a:r>
+            <a:r>
+              <a:rPr lang="en-GB" dirty="0">
+                <a:solidFill>
+                  <a:srgbClr val="202122"/>
+                </a:solidFill>
+                <a:highlight>
+                  <a:srgbClr val="FFFFFF"/>
+                </a:highlight>
+                <a:latin typeface="Source Code Pro"/>
+                <a:ea typeface="Source Code Pro"/>
+                <a:cs typeface="Source Code Pro"/>
+                <a:sym typeface="Source Code Pro"/>
+              </a:rPr>
+              <a:t> is the phenomenon in which </a:t>
+            </a:r>
+            <a:r>
+              <a:rPr lang="en-GB" dirty="0">
+                <a:solidFill>
+                  <a:srgbClr val="202122"/>
+                </a:solidFill>
+                <a:latin typeface="Source Code Pro"/>
+                <a:ea typeface="Source Code Pro"/>
+                <a:cs typeface="Source Code Pro"/>
+                <a:sym typeface="Source Code Pro"/>
+              </a:rPr>
+              <a:t>waves</a:t>
+            </a:r>
+            <a:r>
+              <a:rPr lang="en-GB" dirty="0">
+                <a:solidFill>
+                  <a:srgbClr val="202122"/>
+                </a:solidFill>
+                <a:highlight>
+                  <a:srgbClr val="FFFFFF"/>
+                </a:highlight>
+                <a:latin typeface="Source Code Pro"/>
+                <a:ea typeface="Source Code Pro"/>
+                <a:cs typeface="Source Code Pro"/>
+                <a:sym typeface="Source Code Pro"/>
+              </a:rPr>
+              <a:t> arriving at the </a:t>
+            </a:r>
+            <a:r>
+              <a:rPr lang="en-GB" dirty="0">
+                <a:solidFill>
+                  <a:srgbClr val="202122"/>
+                </a:solidFill>
+                <a:latin typeface="Source Code Pro"/>
+                <a:ea typeface="Source Code Pro"/>
+                <a:cs typeface="Source Code Pro"/>
+                <a:sym typeface="Source Code Pro"/>
+              </a:rPr>
+              <a:t>interface</a:t>
+            </a:r>
+            <a:r>
+              <a:rPr lang="en-GB" dirty="0">
+                <a:solidFill>
+                  <a:srgbClr val="202122"/>
+                </a:solidFill>
+                <a:highlight>
+                  <a:srgbClr val="FFFFFF"/>
+                </a:highlight>
+                <a:latin typeface="Source Code Pro"/>
+                <a:ea typeface="Source Code Pro"/>
+                <a:cs typeface="Source Code Pro"/>
+                <a:sym typeface="Source Code Pro"/>
+              </a:rPr>
+              <a:t> (boundary) from one </a:t>
+            </a:r>
+            <a:r>
+              <a:rPr lang="en-GB" dirty="0">
+                <a:solidFill>
+                  <a:srgbClr val="202122"/>
+                </a:solidFill>
+                <a:latin typeface="Source Code Pro"/>
+                <a:ea typeface="Source Code Pro"/>
+                <a:cs typeface="Source Code Pro"/>
+                <a:sym typeface="Source Code Pro"/>
+              </a:rPr>
+              <a:t>medium</a:t>
+            </a:r>
+            <a:r>
+              <a:rPr lang="en-GB" dirty="0">
+                <a:solidFill>
+                  <a:srgbClr val="202122"/>
+                </a:solidFill>
+                <a:highlight>
+                  <a:srgbClr val="FFFFFF"/>
+                </a:highlight>
+                <a:latin typeface="Source Code Pro"/>
+                <a:ea typeface="Source Code Pro"/>
+                <a:cs typeface="Source Code Pro"/>
+                <a:sym typeface="Source Code Pro"/>
+              </a:rPr>
+              <a:t> to another are not </a:t>
+            </a:r>
+            <a:r>
+              <a:rPr lang="en-GB" dirty="0">
+                <a:solidFill>
+                  <a:srgbClr val="202122"/>
+                </a:solidFill>
+                <a:latin typeface="Source Code Pro"/>
+                <a:ea typeface="Source Code Pro"/>
+                <a:cs typeface="Source Code Pro"/>
+                <a:sym typeface="Source Code Pro"/>
+              </a:rPr>
+              <a:t>refracted</a:t>
+            </a:r>
+            <a:r>
+              <a:rPr lang="en-GB" dirty="0">
+                <a:solidFill>
+                  <a:srgbClr val="202122"/>
+                </a:solidFill>
+                <a:highlight>
+                  <a:srgbClr val="FFFFFF"/>
+                </a:highlight>
+                <a:latin typeface="Source Code Pro"/>
+                <a:ea typeface="Source Code Pro"/>
+                <a:cs typeface="Source Code Pro"/>
+                <a:sym typeface="Source Code Pro"/>
+              </a:rPr>
+              <a:t> into the second medium, but completely </a:t>
+            </a:r>
+            <a:r>
+              <a:rPr lang="en-GB" dirty="0">
+                <a:solidFill>
+                  <a:srgbClr val="202122"/>
+                </a:solidFill>
+                <a:latin typeface="Source Code Pro"/>
+                <a:ea typeface="Source Code Pro"/>
+                <a:cs typeface="Source Code Pro"/>
+                <a:sym typeface="Source Code Pro"/>
+              </a:rPr>
+              <a:t>reflected</a:t>
+            </a:r>
+            <a:r>
+              <a:rPr lang="en-GB" dirty="0">
+                <a:solidFill>
+                  <a:srgbClr val="202122"/>
+                </a:solidFill>
+                <a:highlight>
+                  <a:srgbClr val="FFFFFF"/>
+                </a:highlight>
+                <a:latin typeface="Source Code Pro"/>
+                <a:ea typeface="Source Code Pro"/>
+                <a:cs typeface="Source Code Pro"/>
+                <a:sym typeface="Source Code Pro"/>
+              </a:rPr>
+              <a:t> back into the first medium.</a:t>
+            </a:r>
+            <a:endParaRPr dirty="0">
+              <a:latin typeface="Source Code Pro"/>
+              <a:ea typeface="Source Code Pro"/>
+              <a:cs typeface="Source Code Pro"/>
+              <a:sym typeface="Source Code Pro"/>
+            </a:endParaRPr>
+          </a:p>
+        </p:txBody>
+      </p:sp>
+    </p:spTree>
+  </p:cSld>
+  <p:clrMapOvr>
+    <a:masterClrMapping/>
+  </p:clrMapOvr>
 </p:sld>
 </file>
 

</xml_diff>